<commit_message>
commit my opensource ppt for kata and k8s
Signed-off-by: Qi Feng Huo <huoqif@cn.ibm.com>
</commit_message>
<xml_diff>
--- a/coco/attestation-ibmse.pptx
+++ b/coco/attestation-ibmse.pptx
@@ -115,6 +115,11 @@
       </a:defRPr>
     </a:lvl9pPr>
   </p:defaultTextStyle>
+  <p:extLst>
+    <p:ext uri="{EFAFB233-063F-42B5-8137-9DF3F51BA10A}">
+      <p15:sldGuideLst xmlns:p15="http://schemas.microsoft.com/office/powerpoint/2012/main"/>
+    </p:ext>
+  </p:extLst>
 </p:presentation>
 </file>
 
@@ -200,7 +205,7 @@
           <a:p>
             <a:fld id="{4B9CBDF7-DA10-E449-80CD-76E28EDDB1BC}" type="datetimeFigureOut">
               <a:rPr lang="en-CN" smtClean="0"/>
-              <a:t>2024/7/16</a:t>
+              <a:t>2024/7/17</a:t>
             </a:fld>
             <a:endParaRPr lang="en-CN"/>
           </a:p>
@@ -913,7 +918,7 @@
           <a:p>
             <a:fld id="{C7BE82A7-0AEA-3C4F-B249-688782DB0338}" type="datetimeFigureOut">
               <a:rPr lang="en-CN" smtClean="0"/>
-              <a:t>2024/7/16</a:t>
+              <a:t>2024/7/17</a:t>
             </a:fld>
             <a:endParaRPr lang="en-CN"/>
           </a:p>
@@ -1113,7 +1118,7 @@
           <a:p>
             <a:fld id="{C7BE82A7-0AEA-3C4F-B249-688782DB0338}" type="datetimeFigureOut">
               <a:rPr lang="en-CN" smtClean="0"/>
-              <a:t>2024/7/16</a:t>
+              <a:t>2024/7/17</a:t>
             </a:fld>
             <a:endParaRPr lang="en-CN"/>
           </a:p>
@@ -1323,7 +1328,7 @@
           <a:p>
             <a:fld id="{C7BE82A7-0AEA-3C4F-B249-688782DB0338}" type="datetimeFigureOut">
               <a:rPr lang="en-CN" smtClean="0"/>
-              <a:t>2024/7/16</a:t>
+              <a:t>2024/7/17</a:t>
             </a:fld>
             <a:endParaRPr lang="en-CN"/>
           </a:p>
@@ -1523,7 +1528,7 @@
           <a:p>
             <a:fld id="{C7BE82A7-0AEA-3C4F-B249-688782DB0338}" type="datetimeFigureOut">
               <a:rPr lang="en-CN" smtClean="0"/>
-              <a:t>2024/7/16</a:t>
+              <a:t>2024/7/17</a:t>
             </a:fld>
             <a:endParaRPr lang="en-CN"/>
           </a:p>
@@ -1799,7 +1804,7 @@
           <a:p>
             <a:fld id="{C7BE82A7-0AEA-3C4F-B249-688782DB0338}" type="datetimeFigureOut">
               <a:rPr lang="en-CN" smtClean="0"/>
-              <a:t>2024/7/16</a:t>
+              <a:t>2024/7/17</a:t>
             </a:fld>
             <a:endParaRPr lang="en-CN"/>
           </a:p>
@@ -2067,7 +2072,7 @@
           <a:p>
             <a:fld id="{C7BE82A7-0AEA-3C4F-B249-688782DB0338}" type="datetimeFigureOut">
               <a:rPr lang="en-CN" smtClean="0"/>
-              <a:t>2024/7/16</a:t>
+              <a:t>2024/7/17</a:t>
             </a:fld>
             <a:endParaRPr lang="en-CN"/>
           </a:p>
@@ -2482,7 +2487,7 @@
           <a:p>
             <a:fld id="{C7BE82A7-0AEA-3C4F-B249-688782DB0338}" type="datetimeFigureOut">
               <a:rPr lang="en-CN" smtClean="0"/>
-              <a:t>2024/7/16</a:t>
+              <a:t>2024/7/17</a:t>
             </a:fld>
             <a:endParaRPr lang="en-CN"/>
           </a:p>
@@ -2624,7 +2629,7 @@
           <a:p>
             <a:fld id="{C7BE82A7-0AEA-3C4F-B249-688782DB0338}" type="datetimeFigureOut">
               <a:rPr lang="en-CN" smtClean="0"/>
-              <a:t>2024/7/16</a:t>
+              <a:t>2024/7/17</a:t>
             </a:fld>
             <a:endParaRPr lang="en-CN"/>
           </a:p>
@@ -2737,7 +2742,7 @@
           <a:p>
             <a:fld id="{C7BE82A7-0AEA-3C4F-B249-688782DB0338}" type="datetimeFigureOut">
               <a:rPr lang="en-CN" smtClean="0"/>
-              <a:t>2024/7/16</a:t>
+              <a:t>2024/7/17</a:t>
             </a:fld>
             <a:endParaRPr lang="en-CN"/>
           </a:p>
@@ -3050,7 +3055,7 @@
           <a:p>
             <a:fld id="{C7BE82A7-0AEA-3C4F-B249-688782DB0338}" type="datetimeFigureOut">
               <a:rPr lang="en-CN" smtClean="0"/>
-              <a:t>2024/7/16</a:t>
+              <a:t>2024/7/17</a:t>
             </a:fld>
             <a:endParaRPr lang="en-CN"/>
           </a:p>
@@ -3339,7 +3344,7 @@
           <a:p>
             <a:fld id="{C7BE82A7-0AEA-3C4F-B249-688782DB0338}" type="datetimeFigureOut">
               <a:rPr lang="en-CN" smtClean="0"/>
-              <a:t>2024/7/16</a:t>
+              <a:t>2024/7/17</a:t>
             </a:fld>
             <a:endParaRPr lang="en-CN"/>
           </a:p>
@@ -3582,7 +3587,7 @@
           <a:p>
             <a:fld id="{C7BE82A7-0AEA-3C4F-B249-688782DB0338}" type="datetimeFigureOut">
               <a:rPr lang="en-CN" smtClean="0"/>
-              <a:t>2024/7/16</a:t>
+              <a:t>2024/7/17</a:t>
             </a:fld>
             <a:endParaRPr lang="en-CN"/>
           </a:p>
@@ -5114,10 +5119,10 @@
       </p:sp>
       <p:pic>
         <p:nvPicPr>
-          <p:cNvPr id="6" name="Picture 5">
-            <a:extLst>
-              <a:ext uri="{FF2B5EF4-FFF2-40B4-BE49-F238E27FC236}">
-                <a16:creationId xmlns:a16="http://schemas.microsoft.com/office/drawing/2014/main" id="{391C849C-51AB-1577-14DD-522F50004D27}"/>
+          <p:cNvPr id="4" name="Picture 3">
+            <a:extLst>
+              <a:ext uri="{FF2B5EF4-FFF2-40B4-BE49-F238E27FC236}">
+                <a16:creationId xmlns:a16="http://schemas.microsoft.com/office/drawing/2014/main" id="{78043CF7-9EF3-238C-E5C1-DA596DE10A27}"/>
               </a:ext>
             </a:extLst>
           </p:cNvPr>
@@ -5134,8 +5139,38 @@
         </p:blipFill>
         <p:spPr>
           <a:xfrm>
-            <a:off x="726688" y="911682"/>
-            <a:ext cx="9788912" cy="5385829"/>
+            <a:off x="7228703" y="1757489"/>
+            <a:ext cx="4844112" cy="3121550"/>
+          </a:xfrm>
+          <a:prstGeom prst="rect">
+            <a:avLst/>
+          </a:prstGeom>
+        </p:spPr>
+      </p:pic>
+      <p:pic>
+        <p:nvPicPr>
+          <p:cNvPr id="7" name="Picture 6">
+            <a:extLst>
+              <a:ext uri="{FF2B5EF4-FFF2-40B4-BE49-F238E27FC236}">
+                <a16:creationId xmlns:a16="http://schemas.microsoft.com/office/drawing/2014/main" id="{35D44C00-9F24-42A7-C9E9-6BE14DDDBA7A}"/>
+              </a:ext>
+            </a:extLst>
+          </p:cNvPr>
+          <p:cNvPicPr>
+            <a:picLocks noChangeAspect="1"/>
+          </p:cNvPicPr>
+          <p:nvPr/>
+        </p:nvPicPr>
+        <p:blipFill>
+          <a:blip r:embed="rId4"/>
+          <a:stretch>
+            <a:fillRect/>
+          </a:stretch>
+        </p:blipFill>
+        <p:spPr>
+          <a:xfrm>
+            <a:off x="247135" y="839067"/>
+            <a:ext cx="6077968" cy="5649601"/>
           </a:xfrm>
           <a:prstGeom prst="rect">
             <a:avLst/>

</xml_diff>